<commit_message>
Complete revers model.py and new ER diag
</commit_message>
<xml_diff>
--- a/ERdiagrams/ER.pptx
+++ b/ERdiagrams/ER.pptx
@@ -3386,8 +3386,8 @@
           <a:p>
             <a:pPr algn="ctr"/>
             <a:r>
-              <a:rPr lang="en-US" sz="1999" dirty="0" err="1"/>
-              <a:t>order_item</a:t>
+              <a:rPr lang="en-US" sz="1999" dirty="0" err="1" smtClean="0"/>
+              <a:t>orderitems</a:t>
             </a:r>
             <a:endParaRPr lang="en-US" sz="1999" dirty="0"/>
           </a:p>
@@ -5482,6 +5482,88 @@
           <a:xfrm>
             <a:off x="6962055" y="1540281"/>
             <a:ext cx="5691" cy="540851"/>
+          </a:xfrm>
+          <a:prstGeom prst="line">
+            <a:avLst/>
+          </a:prstGeom>
+        </p:spPr>
+        <p:style>
+          <a:lnRef idx="1">
+            <a:schemeClr val="accent1"/>
+          </a:lnRef>
+          <a:fillRef idx="0">
+            <a:schemeClr val="accent1"/>
+          </a:fillRef>
+          <a:effectRef idx="0">
+            <a:schemeClr val="accent1"/>
+          </a:effectRef>
+          <a:fontRef idx="minor">
+            <a:schemeClr val="tx1"/>
+          </a:fontRef>
+        </p:style>
+      </p:cxnSp>
+      <p:sp>
+        <p:nvSpPr>
+          <p:cNvPr id="64" name="Oval 63"/>
+          <p:cNvSpPr/>
+          <p:nvPr/>
+        </p:nvSpPr>
+        <p:spPr>
+          <a:xfrm>
+            <a:off x="978537" y="15173229"/>
+            <a:ext cx="1497994" cy="590388"/>
+          </a:xfrm>
+          <a:prstGeom prst="ellipse">
+            <a:avLst/>
+          </a:prstGeom>
+        </p:spPr>
+        <p:style>
+          <a:lnRef idx="2">
+            <a:schemeClr val="accent1">
+              <a:shade val="50000"/>
+            </a:schemeClr>
+          </a:lnRef>
+          <a:fillRef idx="1">
+            <a:schemeClr val="accent1"/>
+          </a:fillRef>
+          <a:effectRef idx="0">
+            <a:schemeClr val="accent1"/>
+          </a:effectRef>
+          <a:fontRef idx="minor">
+            <a:schemeClr val="lt1"/>
+          </a:fontRef>
+        </p:style>
+        <p:txBody>
+          <a:bodyPr rot="0" spcFirstLastPara="0" vertOverflow="overflow" horzOverflow="overflow" vert="horz" wrap="square" lIns="91440" tIns="45720" rIns="91440" bIns="45720" numCol="1" spcCol="0" rtlCol="0" fromWordArt="0" anchor="ctr" anchorCtr="0" forceAA="0" compatLnSpc="1">
+            <a:prstTxWarp prst="textNoShape">
+              <a:avLst/>
+            </a:prstTxWarp>
+            <a:noAutofit/>
+          </a:bodyPr>
+          <a:lstStyle/>
+          <a:p>
+            <a:pPr algn="ctr"/>
+            <a:r>
+              <a:rPr lang="en-US" sz="1999" dirty="0" err="1" smtClean="0"/>
+              <a:t>qty</a:t>
+            </a:r>
+            <a:endParaRPr lang="en-US" sz="1999" dirty="0"/>
+          </a:p>
+        </p:txBody>
+      </p:sp>
+      <p:cxnSp>
+        <p:nvCxnSpPr>
+          <p:cNvPr id="65" name="Straight Connector 64"/>
+          <p:cNvCxnSpPr>
+            <a:stCxn id="64" idx="7"/>
+            <a:endCxn id="73" idx="1"/>
+          </p:cNvCxnSpPr>
+          <p:nvPr/>
+        </p:nvCxnSpPr>
+        <p:spPr>
+          <a:xfrm flipV="1">
+            <a:off x="2257155" y="13932097"/>
+            <a:ext cx="520254" cy="1327592"/>
           </a:xfrm>
           <a:prstGeom prst="line">
             <a:avLst/>

</xml_diff>